<commit_message>
updating query to avoid category filtering
</commit_message>
<xml_diff>
--- a/template.pptx
+++ b/template.pptx
@@ -1,6 +1,6 @@
 
 <file path=ppt/presentation.xml><?xml version="1.0" encoding="utf-8"?>
-<p:presentation xmlns:a="http://schemas.openxmlformats.org/drawingml/2006/main" xmlns:r="http://schemas.openxmlformats.org/officeDocument/2006/relationships" xmlns:p="http://schemas.openxmlformats.org/presentationml/2006/main" saveSubsetFonts="1">
+<p:presentation xmlns:a="http://schemas.openxmlformats.org/drawingml/2006/main" xmlns:r="http://schemas.openxmlformats.org/officeDocument/2006/relationships" xmlns:p="http://schemas.openxmlformats.org/presentationml/2006/main" embedTrueTypeFonts="1">
   <p:sldMasterIdLst>
     <p:sldMasterId id="2147483648" r:id="rId1"/>
   </p:sldMasterIdLst>
@@ -9,6 +9,18 @@
   </p:sldIdLst>
   <p:sldSz cx="12192000" cy="6858000"/>
   <p:notesSz cx="6858000" cy="9144000"/>
+  <p:embeddedFontLst>
+    <p:embeddedFont>
+      <p:font typeface="Open Sauce Sans Black" panose="00000A00000000000000" pitchFamily="2" charset="0"/>
+      <p:bold r:id="rId3"/>
+    </p:embeddedFont>
+    <p:embeddedFont>
+      <p:font typeface="Source Sans Pro" panose="020B0503030403020204" pitchFamily="34" charset="0"/>
+      <p:regular r:id="rId4"/>
+      <p:bold r:id="rId5"/>
+      <p:italic r:id="rId6"/>
+    </p:embeddedFont>
+  </p:embeddedFontLst>
   <p:defaultTextStyle>
     <a:defPPr>
       <a:defRPr lang="en-US"/>
@@ -862,14 +874,14 @@
           </a:bodyPr>
           <a:lstStyle>
             <a:lvl1pPr algn="l">
-              <a:defRPr sz="6200">
+              <a:defRPr sz="5400">
                 <a:solidFill>
                   <a:schemeClr val="tx1">
                     <a:lumMod val="75000"/>
                     <a:lumOff val="25000"/>
                   </a:schemeClr>
                 </a:solidFill>
-                <a:latin typeface="Open Sauce One Black" panose="00000A00000000000000" pitchFamily="2" charset="0"/>
+                <a:latin typeface="Open Sauce Sans Black" panose="00000A00000000000000" pitchFamily="2" charset="0"/>
               </a:defRPr>
             </a:lvl1pPr>
           </a:lstStyle>
@@ -1001,7 +1013,7 @@
             <a:fld id="{8883BF1E-05C7-4984-80DD-F8AA975B0D5B}" type="datetimeFigureOut">
               <a:rPr lang="en-US" smtClean="0"/>
               <a:pPr/>
-              <a:t>12/15/2024</a:t>
+              <a:t>2/6/2025</a:t>
             </a:fld>
             <a:endParaRPr lang="en-US" dirty="0"/>
           </a:p>
@@ -1206,7 +1218,7 @@
             <a:fld id="{8883BF1E-05C7-4984-80DD-F8AA975B0D5B}" type="datetimeFigureOut">
               <a:rPr lang="en-US" smtClean="0"/>
               <a:pPr/>
-              <a:t>12/15/2024</a:t>
+              <a:t>2/6/2025</a:t>
             </a:fld>
             <a:endParaRPr lang="en-US"/>
           </a:p>
@@ -1359,10 +1371,12 @@
           </a:prstGeom>
         </p:spPr>
         <p:txBody>
-          <a:bodyPr anchor="b"/>
+          <a:bodyPr anchor="b">
+            <a:normAutofit/>
+          </a:bodyPr>
           <a:lstStyle>
             <a:lvl1pPr>
-              <a:defRPr sz="3200"/>
+              <a:defRPr sz="2000"/>
             </a:lvl1pPr>
           </a:lstStyle>
           <a:p>
@@ -1401,19 +1415,19 @@
           </a:bodyPr>
           <a:lstStyle>
             <a:lvl1pPr>
-              <a:defRPr sz="2400"/>
+              <a:defRPr sz="1800"/>
             </a:lvl1pPr>
             <a:lvl2pPr>
-              <a:defRPr sz="2000"/>
+              <a:defRPr sz="1600"/>
             </a:lvl2pPr>
             <a:lvl3pPr>
-              <a:defRPr sz="1800"/>
+              <a:defRPr sz="1400"/>
             </a:lvl3pPr>
             <a:lvl4pPr>
-              <a:defRPr sz="1600"/>
+              <a:defRPr sz="1200"/>
             </a:lvl4pPr>
             <a:lvl5pPr>
-              <a:defRPr sz="1600"/>
+              <a:defRPr sz="1200"/>
             </a:lvl5pPr>
             <a:lvl6pPr>
               <a:defRPr sz="2000"/>
@@ -1578,7 +1592,7 @@
             <a:fld id="{8883BF1E-05C7-4984-80DD-F8AA975B0D5B}" type="datetimeFigureOut">
               <a:rPr lang="en-US" smtClean="0"/>
               <a:pPr/>
-              <a:t>12/15/2024</a:t>
+              <a:t>2/6/2025</a:t>
             </a:fld>
             <a:endParaRPr lang="en-US"/>
           </a:p>
@@ -1731,12 +1745,12 @@
           </a:prstGeom>
         </p:spPr>
         <p:txBody>
-          <a:bodyPr anchor="b">
+          <a:bodyPr anchor="ctr">
             <a:normAutofit/>
           </a:bodyPr>
           <a:lstStyle>
             <a:lvl1pPr>
-              <a:defRPr sz="4000"/>
+              <a:defRPr sz="3600"/>
             </a:lvl1pPr>
           </a:lstStyle>
           <a:p>
@@ -1929,7 +1943,7 @@
             <a:fld id="{8883BF1E-05C7-4984-80DD-F8AA975B0D5B}" type="datetimeFigureOut">
               <a:rPr lang="en-US" smtClean="0"/>
               <a:pPr/>
-              <a:t>12/15/2024</a:t>
+              <a:t>2/6/2025</a:t>
             </a:fld>
             <a:endParaRPr lang="en-US"/>
           </a:p>
@@ -2084,19 +2098,19 @@
           </a:bodyPr>
           <a:lstStyle>
             <a:lvl1pPr>
-              <a:defRPr sz="2400"/>
+              <a:defRPr sz="2000"/>
             </a:lvl1pPr>
             <a:lvl2pPr>
-              <a:defRPr sz="2000"/>
+              <a:defRPr sz="1800"/>
             </a:lvl2pPr>
             <a:lvl3pPr>
-              <a:defRPr sz="1800"/>
+              <a:defRPr sz="1600"/>
             </a:lvl3pPr>
             <a:lvl4pPr>
-              <a:defRPr sz="1600"/>
+              <a:defRPr sz="1400"/>
             </a:lvl4pPr>
             <a:lvl5pPr>
-              <a:defRPr sz="1600"/>
+              <a:defRPr sz="1400"/>
             </a:lvl5pPr>
           </a:lstStyle>
           <a:p>
@@ -2178,7 +2192,7 @@
             <a:fld id="{8883BF1E-05C7-4984-80DD-F8AA975B0D5B}" type="datetimeFigureOut">
               <a:rPr lang="en-US" smtClean="0"/>
               <a:pPr/>
-              <a:t>12/15/2024</a:t>
+              <a:t>2/6/2025</a:t>
             </a:fld>
             <a:endParaRPr lang="en-US"/>
           </a:p>
@@ -2301,12 +2315,12 @@
           </a:prstGeom>
         </p:spPr>
         <p:txBody>
-          <a:bodyPr anchor="b">
+          <a:bodyPr anchor="ctr">
             <a:normAutofit/>
           </a:bodyPr>
           <a:lstStyle>
             <a:lvl1pPr>
-              <a:defRPr sz="4000"/>
+              <a:defRPr sz="3600"/>
             </a:lvl1pPr>
           </a:lstStyle>
           <a:p>
@@ -2373,11 +2387,17 @@
           </a:prstGeom>
         </p:spPr>
         <p:txBody>
-          <a:bodyPr vert="eaVert"/>
-          <a:lstStyle/>
-          <a:p>
-            <a:r>
-              <a:rPr lang="en-US"/>
+          <a:bodyPr vert="eaVert" anchor="ctr">
+            <a:normAutofit/>
+          </a:bodyPr>
+          <a:lstStyle>
+            <a:lvl1pPr>
+              <a:defRPr sz="3600"/>
+            </a:lvl1pPr>
+          </a:lstStyle>
+          <a:p>
+            <a:r>
+              <a:rPr lang="en-US" dirty="0"/>
               <a:t>Click to edit Master title style</a:t>
             </a:r>
           </a:p>
@@ -2411,19 +2431,19 @@
           </a:bodyPr>
           <a:lstStyle>
             <a:lvl1pPr>
-              <a:defRPr sz="2400"/>
+              <a:defRPr sz="2000"/>
             </a:lvl1pPr>
             <a:lvl2pPr>
-              <a:defRPr sz="2000"/>
+              <a:defRPr sz="1800"/>
             </a:lvl2pPr>
             <a:lvl3pPr>
-              <a:defRPr sz="1800"/>
+              <a:defRPr sz="1600"/>
             </a:lvl3pPr>
             <a:lvl4pPr>
-              <a:defRPr sz="1600"/>
+              <a:defRPr sz="1400"/>
             </a:lvl4pPr>
             <a:lvl5pPr>
-              <a:defRPr sz="1600"/>
+              <a:defRPr sz="1400"/>
             </a:lvl5pPr>
           </a:lstStyle>
           <a:p>
@@ -2505,7 +2525,7 @@
             <a:fld id="{8883BF1E-05C7-4984-80DD-F8AA975B0D5B}" type="datetimeFigureOut">
               <a:rPr lang="en-US" smtClean="0"/>
               <a:pPr/>
-              <a:t>12/15/2024</a:t>
+              <a:t>2/6/2025</a:t>
             </a:fld>
             <a:endParaRPr lang="en-US"/>
           </a:p>
@@ -2666,10 +2686,12 @@
           </a:prstGeom>
         </p:spPr>
         <p:txBody>
-          <a:bodyPr anchor="b"/>
+          <a:bodyPr anchor="b">
+            <a:normAutofit/>
+          </a:bodyPr>
           <a:lstStyle>
             <a:lvl1pPr>
-              <a:defRPr sz="6000">
+              <a:defRPr sz="4800">
                 <a:solidFill>
                   <a:schemeClr val="bg1">
                     <a:lumMod val="95000"/>
@@ -2853,7 +2875,7 @@
             <a:fld id="{8883BF1E-05C7-4984-80DD-F8AA975B0D5B}" type="datetimeFigureOut">
               <a:rPr lang="en-US" smtClean="0"/>
               <a:pPr/>
-              <a:t>12/15/2024</a:t>
+              <a:t>2/6/2025</a:t>
             </a:fld>
             <a:endParaRPr lang="en-US"/>
           </a:p>
@@ -3006,10 +3028,14 @@
           </a:prstGeom>
         </p:spPr>
         <p:txBody>
-          <a:bodyPr vert="horz" lIns="91440" tIns="45720" rIns="91440" bIns="45720" rtlCol="0" anchor="b">
+          <a:bodyPr vert="horz" lIns="91440" tIns="45720" rIns="91440" bIns="45720" rtlCol="0" anchor="ctr">
             <a:normAutofit/>
           </a:bodyPr>
-          <a:lstStyle/>
+          <a:lstStyle>
+            <a:lvl1pPr>
+              <a:defRPr sz="3600"/>
+            </a:lvl1pPr>
+          </a:lstStyle>
           <a:p>
             <a:r>
               <a:rPr lang="en-US" dirty="0"/>
@@ -3099,7 +3125,7 @@
           <a:lstStyle>
             <a:lvl1pPr marL="0" indent="0">
               <a:buNone/>
-              <a:defRPr sz="2400">
+              <a:defRPr sz="1600">
                 <a:solidFill>
                   <a:schemeClr val="tx1">
                     <a:lumMod val="75000"/>
@@ -3224,10 +3250,14 @@
           </a:prstGeom>
         </p:spPr>
         <p:txBody>
-          <a:bodyPr vert="horz" lIns="91440" tIns="45720" rIns="91440" bIns="45720" rtlCol="0" anchor="b">
+          <a:bodyPr vert="horz" lIns="91440" tIns="45720" rIns="91440" bIns="45720" rtlCol="0" anchor="ctr">
             <a:normAutofit/>
           </a:bodyPr>
-          <a:lstStyle/>
+          <a:lstStyle>
+            <a:lvl1pPr>
+              <a:defRPr sz="3600"/>
+            </a:lvl1pPr>
+          </a:lstStyle>
           <a:p>
             <a:r>
               <a:rPr lang="en-US" dirty="0"/>
@@ -3316,19 +3346,19 @@
           </a:bodyPr>
           <a:lstStyle>
             <a:lvl1pPr>
-              <a:defRPr sz="2400"/>
+              <a:defRPr sz="1600"/>
             </a:lvl1pPr>
             <a:lvl2pPr>
-              <a:defRPr sz="2000"/>
+              <a:defRPr sz="1400"/>
             </a:lvl2pPr>
             <a:lvl3pPr>
-              <a:defRPr sz="1800"/>
+              <a:defRPr sz="1200"/>
             </a:lvl3pPr>
             <a:lvl4pPr>
-              <a:defRPr sz="1600"/>
+              <a:defRPr sz="1100"/>
             </a:lvl4pPr>
             <a:lvl5pPr>
-              <a:defRPr sz="1600"/>
+              <a:defRPr sz="1100"/>
             </a:lvl5pPr>
           </a:lstStyle>
           <a:p>
@@ -3426,8 +3456,11 @@
           </a:bodyPr>
           <a:lstStyle>
             <a:lvl1pPr marL="0" indent="0">
-              <a:buNone/>
-              <a:defRPr sz="2400" b="1" i="0"/>
+              <a:lnSpc>
+                <a:spcPct val="100000"/>
+              </a:lnSpc>
+              <a:buNone/>
+              <a:defRPr sz="2000" b="1" i="0"/>
             </a:lvl1pPr>
             <a:lvl2pPr marL="457200" indent="0">
               <a:buNone/>
@@ -3499,19 +3532,19 @@
           </a:bodyPr>
           <a:lstStyle>
             <a:lvl1pPr>
-              <a:defRPr sz="2400"/>
+              <a:defRPr sz="1600"/>
             </a:lvl1pPr>
             <a:lvl2pPr>
-              <a:defRPr sz="2000"/>
+              <a:defRPr sz="1400"/>
             </a:lvl2pPr>
             <a:lvl3pPr>
-              <a:defRPr sz="1800"/>
+              <a:defRPr sz="1200"/>
             </a:lvl3pPr>
             <a:lvl4pPr>
-              <a:defRPr sz="1600"/>
+              <a:defRPr sz="1100"/>
             </a:lvl4pPr>
             <a:lvl5pPr>
-              <a:defRPr sz="1600"/>
+              <a:defRPr sz="1100"/>
             </a:lvl5pPr>
           </a:lstStyle>
           <a:p>
@@ -3577,12 +3610,12 @@
           </a:prstGeom>
         </p:spPr>
         <p:txBody>
-          <a:bodyPr anchor="b">
+          <a:bodyPr anchor="ctr">
             <a:normAutofit/>
           </a:bodyPr>
           <a:lstStyle>
             <a:lvl1pPr>
-              <a:defRPr sz="4000"/>
+              <a:defRPr sz="3600"/>
             </a:lvl1pPr>
           </a:lstStyle>
           <a:p>
@@ -3768,7 +3801,7 @@
           </a:prstGeom>
         </p:spPr>
         <p:txBody>
-          <a:bodyPr anchor="b">
+          <a:bodyPr anchor="ctr">
             <a:normAutofit/>
           </a:bodyPr>
           <a:lstStyle>
@@ -3812,19 +3845,19 @@
           </a:bodyPr>
           <a:lstStyle>
             <a:lvl1pPr>
-              <a:defRPr sz="2400"/>
+              <a:defRPr sz="1600"/>
             </a:lvl1pPr>
             <a:lvl2pPr>
-              <a:defRPr sz="2000"/>
+              <a:defRPr sz="1400"/>
             </a:lvl2pPr>
             <a:lvl3pPr>
-              <a:defRPr sz="1800"/>
+              <a:defRPr sz="1200"/>
             </a:lvl3pPr>
             <a:lvl4pPr>
-              <a:defRPr sz="1600"/>
+              <a:defRPr sz="1100"/>
             </a:lvl4pPr>
             <a:lvl5pPr>
-              <a:defRPr sz="1600"/>
+              <a:defRPr sz="1100"/>
             </a:lvl5pPr>
           </a:lstStyle>
           <a:p>
@@ -4039,7 +4072,7 @@
           </a:prstGeom>
         </p:spPr>
         <p:txBody>
-          <a:bodyPr anchor="b">
+          <a:bodyPr anchor="ctr">
             <a:normAutofit/>
           </a:bodyPr>
           <a:lstStyle>
@@ -4547,7 +4580,7 @@
             <a:fld id="{8883BF1E-05C7-4984-80DD-F8AA975B0D5B}" type="datetimeFigureOut">
               <a:rPr lang="en-US" smtClean="0"/>
               <a:pPr/>
-              <a:t>12/15/2024</a:t>
+              <a:t>2/6/2025</a:t>
             </a:fld>
             <a:endParaRPr lang="en-US"/>
           </a:p>
@@ -4670,12 +4703,12 @@
           </a:prstGeom>
         </p:spPr>
         <p:txBody>
-          <a:bodyPr anchor="b">
+          <a:bodyPr anchor="ctr">
             <a:normAutofit/>
           </a:bodyPr>
           <a:lstStyle>
             <a:lvl1pPr>
-              <a:defRPr sz="4000"/>
+              <a:defRPr sz="3600"/>
             </a:lvl1pPr>
           </a:lstStyle>
           <a:p>
@@ -4747,7 +4780,7 @@
           </a:prstGeom>
         </p:spPr>
         <p:txBody>
-          <a:bodyPr vert="horz" lIns="91440" tIns="45720" rIns="91440" bIns="45720" rtlCol="0" anchor="b">
+          <a:bodyPr vert="horz" lIns="91440" tIns="45720" rIns="91440" bIns="45720" rtlCol="0" anchor="ctr">
             <a:normAutofit/>
           </a:bodyPr>
           <a:lstStyle/>
@@ -4964,14 +4997,14 @@
           <a:spcPct val="0"/>
         </a:spcBef>
         <a:buNone/>
-        <a:defRPr sz="4000" kern="1200">
+        <a:defRPr sz="3600" kern="1200">
           <a:solidFill>
             <a:schemeClr val="tx1">
               <a:lumMod val="75000"/>
               <a:lumOff val="25000"/>
             </a:schemeClr>
           </a:solidFill>
-          <a:latin typeface="Open Sauce One Black" panose="00000A00000000000000" pitchFamily="2" charset="0"/>
+          <a:latin typeface="Open Sauce Sans Black" panose="00000A00000000000000" pitchFamily="2" charset="0"/>
           <a:ea typeface="+mj-ea"/>
           <a:cs typeface="+mj-cs"/>
         </a:defRPr>

</xml_diff>